<commit_message>
architecture nav for intro
</commit_message>
<xml_diff>
--- a/assets/images/iot-router.pptx
+++ b/assets/images/iot-router.pptx
@@ -104,6 +104,11 @@
       </a:defRPr>
     </a:lvl9pPr>
   </p:defaultTextStyle>
+  <p:extLst>
+    <p:ext uri="{EFAFB233-063F-42B5-8137-9DF3F51BA10A}">
+      <p15:sldGuideLst xmlns:p15="http://schemas.microsoft.com/office/powerpoint/2012/main"/>
+    </p:ext>
+  </p:extLst>
 </p:presentation>
 </file>
 
@@ -3592,7 +3597,7 @@
             <a:pPr algn="ctr"/>
             <a:r>
               <a:rPr lang="en-IE" dirty="0"/>
-              <a:t>KNX TP</a:t>
+              <a:t>KNX IP</a:t>
             </a:r>
           </a:p>
           <a:p>
@@ -3661,7 +3666,7 @@
             <a:pPr algn="ctr"/>
             <a:r>
               <a:rPr lang="en-IE" dirty="0"/>
-              <a:t>KNX TP</a:t>
+              <a:t>KNX IP</a:t>
             </a:r>
           </a:p>
           <a:p>

</xml_diff>

<commit_message>
fix iot router diagram
</commit_message>
<xml_diff>
--- a/assets/images/iot-router.pptx
+++ b/assets/images/iot-router.pptx
@@ -261,7 +261,7 @@
           <a:p>
             <a:fld id="{212C4670-4160-4E32-8EBF-B0967269D583}" type="datetimeFigureOut">
               <a:rPr lang="en-IE" smtClean="0"/>
-              <a:t>06/09/2022</a:t>
+              <a:t>07/11/2022</a:t>
             </a:fld>
             <a:endParaRPr lang="en-IE"/>
           </a:p>
@@ -461,7 +461,7 @@
           <a:p>
             <a:fld id="{212C4670-4160-4E32-8EBF-B0967269D583}" type="datetimeFigureOut">
               <a:rPr lang="en-IE" smtClean="0"/>
-              <a:t>06/09/2022</a:t>
+              <a:t>07/11/2022</a:t>
             </a:fld>
             <a:endParaRPr lang="en-IE"/>
           </a:p>
@@ -671,7 +671,7 @@
           <a:p>
             <a:fld id="{212C4670-4160-4E32-8EBF-B0967269D583}" type="datetimeFigureOut">
               <a:rPr lang="en-IE" smtClean="0"/>
-              <a:t>06/09/2022</a:t>
+              <a:t>07/11/2022</a:t>
             </a:fld>
             <a:endParaRPr lang="en-IE"/>
           </a:p>
@@ -871,7 +871,7 @@
           <a:p>
             <a:fld id="{212C4670-4160-4E32-8EBF-B0967269D583}" type="datetimeFigureOut">
               <a:rPr lang="en-IE" smtClean="0"/>
-              <a:t>06/09/2022</a:t>
+              <a:t>07/11/2022</a:t>
             </a:fld>
             <a:endParaRPr lang="en-IE"/>
           </a:p>
@@ -1147,7 +1147,7 @@
           <a:p>
             <a:fld id="{212C4670-4160-4E32-8EBF-B0967269D583}" type="datetimeFigureOut">
               <a:rPr lang="en-IE" smtClean="0"/>
-              <a:t>06/09/2022</a:t>
+              <a:t>07/11/2022</a:t>
             </a:fld>
             <a:endParaRPr lang="en-IE"/>
           </a:p>
@@ -1415,7 +1415,7 @@
           <a:p>
             <a:fld id="{212C4670-4160-4E32-8EBF-B0967269D583}" type="datetimeFigureOut">
               <a:rPr lang="en-IE" smtClean="0"/>
-              <a:t>06/09/2022</a:t>
+              <a:t>07/11/2022</a:t>
             </a:fld>
             <a:endParaRPr lang="en-IE"/>
           </a:p>
@@ -1830,7 +1830,7 @@
           <a:p>
             <a:fld id="{212C4670-4160-4E32-8EBF-B0967269D583}" type="datetimeFigureOut">
               <a:rPr lang="en-IE" smtClean="0"/>
-              <a:t>06/09/2022</a:t>
+              <a:t>07/11/2022</a:t>
             </a:fld>
             <a:endParaRPr lang="en-IE"/>
           </a:p>
@@ -1972,7 +1972,7 @@
           <a:p>
             <a:fld id="{212C4670-4160-4E32-8EBF-B0967269D583}" type="datetimeFigureOut">
               <a:rPr lang="en-IE" smtClean="0"/>
-              <a:t>06/09/2022</a:t>
+              <a:t>07/11/2022</a:t>
             </a:fld>
             <a:endParaRPr lang="en-IE"/>
           </a:p>
@@ -2085,7 +2085,7 @@
           <a:p>
             <a:fld id="{212C4670-4160-4E32-8EBF-B0967269D583}" type="datetimeFigureOut">
               <a:rPr lang="en-IE" smtClean="0"/>
-              <a:t>06/09/2022</a:t>
+              <a:t>07/11/2022</a:t>
             </a:fld>
             <a:endParaRPr lang="en-IE"/>
           </a:p>
@@ -2398,7 +2398,7 @@
           <a:p>
             <a:fld id="{212C4670-4160-4E32-8EBF-B0967269D583}" type="datetimeFigureOut">
               <a:rPr lang="en-IE" smtClean="0"/>
-              <a:t>06/09/2022</a:t>
+              <a:t>07/11/2022</a:t>
             </a:fld>
             <a:endParaRPr lang="en-IE"/>
           </a:p>
@@ -2687,7 +2687,7 @@
           <a:p>
             <a:fld id="{212C4670-4160-4E32-8EBF-B0967269D583}" type="datetimeFigureOut">
               <a:rPr lang="en-IE" smtClean="0"/>
-              <a:t>06/09/2022</a:t>
+              <a:t>07/11/2022</a:t>
             </a:fld>
             <a:endParaRPr lang="en-IE"/>
           </a:p>
@@ -2930,7 +2930,7 @@
           <a:p>
             <a:fld id="{212C4670-4160-4E32-8EBF-B0967269D583}" type="datetimeFigureOut">
               <a:rPr lang="en-IE" smtClean="0"/>
-              <a:t>06/09/2022</a:t>
+              <a:t>07/11/2022</a:t>
             </a:fld>
             <a:endParaRPr lang="en-IE"/>
           </a:p>
@@ -3390,12 +3390,15 @@
           <a:p>
             <a:pPr algn="ctr"/>
             <a:r>
-              <a:rPr lang="en-IE" dirty="0" err="1"/>
-              <a:t>Iot</a:t>
-            </a:r>
-            <a:r>
               <a:rPr lang="en-IE" dirty="0"/>
-              <a:t> -router</a:t>
+              <a:t>KNX</a:t>
+            </a:r>
+          </a:p>
+          <a:p>
+            <a:pPr algn="ctr"/>
+            <a:r>
+              <a:rPr lang="en-IE" dirty="0"/>
+              <a:t>IoT -router</a:t>
             </a:r>
           </a:p>
         </p:txBody>
@@ -3465,7 +3468,7 @@
             <a:pPr algn="ctr"/>
             <a:r>
               <a:rPr lang="en-IE" dirty="0"/>
-              <a:t>Device 1 </a:t>
+              <a:t>Device IoT-1 </a:t>
             </a:r>
           </a:p>
         </p:txBody>
@@ -3535,7 +3538,7 @@
             <a:pPr algn="ctr"/>
             <a:r>
               <a:rPr lang="en-IE" dirty="0"/>
-              <a:t>Device 1 </a:t>
+              <a:t>Device IoT-2 </a:t>
             </a:r>
           </a:p>
         </p:txBody>
@@ -3604,7 +3607,7 @@
             <a:pPr algn="ctr"/>
             <a:r>
               <a:rPr lang="en-IE" dirty="0"/>
-              <a:t>Device 1 </a:t>
+              <a:t>Device TP-1 </a:t>
             </a:r>
           </a:p>
         </p:txBody>
@@ -3673,7 +3676,7 @@
             <a:pPr algn="ctr"/>
             <a:r>
               <a:rPr lang="en-IE" dirty="0"/>
-              <a:t>Device 1 </a:t>
+              <a:t>Device IP-1 </a:t>
             </a:r>
           </a:p>
         </p:txBody>

</xml_diff>

<commit_message>
fix in diagram IP->TP
</commit_message>
<xml_diff>
--- a/assets/images/iot-router.pptx
+++ b/assets/images/iot-router.pptx
@@ -261,7 +261,7 @@
           <a:p>
             <a:fld id="{212C4670-4160-4E32-8EBF-B0967269D583}" type="datetimeFigureOut">
               <a:rPr lang="en-IE" smtClean="0"/>
-              <a:t>07/11/2022</a:t>
+              <a:t>08/11/2022</a:t>
             </a:fld>
             <a:endParaRPr lang="en-IE"/>
           </a:p>
@@ -461,7 +461,7 @@
           <a:p>
             <a:fld id="{212C4670-4160-4E32-8EBF-B0967269D583}" type="datetimeFigureOut">
               <a:rPr lang="en-IE" smtClean="0"/>
-              <a:t>07/11/2022</a:t>
+              <a:t>08/11/2022</a:t>
             </a:fld>
             <a:endParaRPr lang="en-IE"/>
           </a:p>
@@ -671,7 +671,7 @@
           <a:p>
             <a:fld id="{212C4670-4160-4E32-8EBF-B0967269D583}" type="datetimeFigureOut">
               <a:rPr lang="en-IE" smtClean="0"/>
-              <a:t>07/11/2022</a:t>
+              <a:t>08/11/2022</a:t>
             </a:fld>
             <a:endParaRPr lang="en-IE"/>
           </a:p>
@@ -871,7 +871,7 @@
           <a:p>
             <a:fld id="{212C4670-4160-4E32-8EBF-B0967269D583}" type="datetimeFigureOut">
               <a:rPr lang="en-IE" smtClean="0"/>
-              <a:t>07/11/2022</a:t>
+              <a:t>08/11/2022</a:t>
             </a:fld>
             <a:endParaRPr lang="en-IE"/>
           </a:p>
@@ -1147,7 +1147,7 @@
           <a:p>
             <a:fld id="{212C4670-4160-4E32-8EBF-B0967269D583}" type="datetimeFigureOut">
               <a:rPr lang="en-IE" smtClean="0"/>
-              <a:t>07/11/2022</a:t>
+              <a:t>08/11/2022</a:t>
             </a:fld>
             <a:endParaRPr lang="en-IE"/>
           </a:p>
@@ -1415,7 +1415,7 @@
           <a:p>
             <a:fld id="{212C4670-4160-4E32-8EBF-B0967269D583}" type="datetimeFigureOut">
               <a:rPr lang="en-IE" smtClean="0"/>
-              <a:t>07/11/2022</a:t>
+              <a:t>08/11/2022</a:t>
             </a:fld>
             <a:endParaRPr lang="en-IE"/>
           </a:p>
@@ -1830,7 +1830,7 @@
           <a:p>
             <a:fld id="{212C4670-4160-4E32-8EBF-B0967269D583}" type="datetimeFigureOut">
               <a:rPr lang="en-IE" smtClean="0"/>
-              <a:t>07/11/2022</a:t>
+              <a:t>08/11/2022</a:t>
             </a:fld>
             <a:endParaRPr lang="en-IE"/>
           </a:p>
@@ -1972,7 +1972,7 @@
           <a:p>
             <a:fld id="{212C4670-4160-4E32-8EBF-B0967269D583}" type="datetimeFigureOut">
               <a:rPr lang="en-IE" smtClean="0"/>
-              <a:t>07/11/2022</a:t>
+              <a:t>08/11/2022</a:t>
             </a:fld>
             <a:endParaRPr lang="en-IE"/>
           </a:p>
@@ -2085,7 +2085,7 @@
           <a:p>
             <a:fld id="{212C4670-4160-4E32-8EBF-B0967269D583}" type="datetimeFigureOut">
               <a:rPr lang="en-IE" smtClean="0"/>
-              <a:t>07/11/2022</a:t>
+              <a:t>08/11/2022</a:t>
             </a:fld>
             <a:endParaRPr lang="en-IE"/>
           </a:p>
@@ -2398,7 +2398,7 @@
           <a:p>
             <a:fld id="{212C4670-4160-4E32-8EBF-B0967269D583}" type="datetimeFigureOut">
               <a:rPr lang="en-IE" smtClean="0"/>
-              <a:t>07/11/2022</a:t>
+              <a:t>08/11/2022</a:t>
             </a:fld>
             <a:endParaRPr lang="en-IE"/>
           </a:p>
@@ -2687,7 +2687,7 @@
           <a:p>
             <a:fld id="{212C4670-4160-4E32-8EBF-B0967269D583}" type="datetimeFigureOut">
               <a:rPr lang="en-IE" smtClean="0"/>
-              <a:t>07/11/2022</a:t>
+              <a:t>08/11/2022</a:t>
             </a:fld>
             <a:endParaRPr lang="en-IE"/>
           </a:p>
@@ -2930,7 +2930,7 @@
           <a:p>
             <a:fld id="{212C4670-4160-4E32-8EBF-B0967269D583}" type="datetimeFigureOut">
               <a:rPr lang="en-IE" smtClean="0"/>
-              <a:t>07/11/2022</a:t>
+              <a:t>08/11/2022</a:t>
             </a:fld>
             <a:endParaRPr lang="en-IE"/>
           </a:p>
@@ -3599,9 +3599,10 @@
           <a:p>
             <a:pPr algn="ctr"/>
             <a:r>
-              <a:rPr lang="en-IE" dirty="0"/>
-              <a:t>KNX IP</a:t>
-            </a:r>
+              <a:rPr lang="en-IE"/>
+              <a:t>KNX TP</a:t>
+            </a:r>
+            <a:endParaRPr lang="en-IE" dirty="0"/>
           </a:p>
           <a:p>
             <a:pPr algn="ctr"/>

</xml_diff>